<commit_message>
text logreg model and minor updates
</commit_message>
<xml_diff>
--- a/project/POSTER.pptx
+++ b/project/POSTER.pptx
@@ -6456,6 +6456,36 @@
           </a:prstGeom>
         </p:spPr>
       </p:pic>
+      <p:pic>
+        <p:nvPicPr>
+          <p:cNvPr id="6" name="Picture 5"/>
+          <p:cNvPicPr>
+            <a:picLocks noChangeAspect="1"/>
+          </p:cNvPicPr>
+          <p:nvPr/>
+        </p:nvPicPr>
+        <p:blipFill>
+          <a:blip r:embed="rId7">
+            <a:extLst>
+              <a:ext uri="{28A0092B-C50C-407E-A947-70E740481C1C}">
+                <a14:useLocalDpi xmlns:a14="http://schemas.microsoft.com/office/drawing/2010/main" val="0"/>
+              </a:ext>
+            </a:extLst>
+          </a:blip>
+          <a:stretch>
+            <a:fillRect/>
+          </a:stretch>
+        </p:blipFill>
+        <p:spPr>
+          <a:xfrm>
+            <a:off x="4270104" y="30438864"/>
+            <a:ext cx="3757457" cy="1590458"/>
+          </a:xfrm>
+          <a:prstGeom prst="rect">
+            <a:avLst/>
+          </a:prstGeom>
+        </p:spPr>
+      </p:pic>
     </p:spTree>
     <p:extLst>
       <p:ext uri="{BB962C8B-B14F-4D97-AF65-F5344CB8AC3E}">

</xml_diff>